<commit_message>
Update __Morphing_FCA_DeepNeuralNework with TensorFlow_lezione.pptx
</commit_message>
<xml_diff>
--- a/__Morphing_FCA_DeepNeuralNework with TensorFlow_lezione.pptx
+++ b/__Morphing_FCA_DeepNeuralNework with TensorFlow_lezione.pptx
@@ -5,10 +5,10 @@
     <p:sldMasterId id="2147483648" r:id="rId1"/>
   </p:sldMasterIdLst>
   <p:notesMasterIdLst>
-    <p:notesMasterId r:id="rId9"/>
+    <p:notesMasterId r:id="rId10"/>
   </p:notesMasterIdLst>
   <p:handoutMasterIdLst>
-    <p:handoutMasterId r:id="rId10"/>
+    <p:handoutMasterId r:id="rId11"/>
   </p:handoutMasterIdLst>
   <p:sldIdLst>
     <p:sldId id="256" r:id="rId2"/>
@@ -17,7 +17,8 @@
     <p:sldId id="265" r:id="rId5"/>
     <p:sldId id="262" r:id="rId6"/>
     <p:sldId id="263" r:id="rId7"/>
-    <p:sldId id="258" r:id="rId8"/>
+    <p:sldId id="266" r:id="rId8"/>
+    <p:sldId id="258" r:id="rId9"/>
   </p:sldIdLst>
   <p:sldSz cx="12192000" cy="6858000"/>
   <p:notesSz cx="6858000" cy="9144000"/>
@@ -221,7 +222,7 @@
           <a:p>
             <a:fld id="{320B36A5-C0C2-41F1-A466-125A3C9CFDA8}" type="datetimeFigureOut">
               <a:rPr lang="it-IT" smtClean="0"/>
-              <a:t>07/05/2025</a:t>
+              <a:t>08/05/2025</a:t>
             </a:fld>
             <a:endParaRPr lang="it-IT"/>
           </a:p>
@@ -399,7 +400,7 @@
           <a:p>
             <a:fld id="{F5E2351F-C622-46DB-BDDE-413EE749618D}" type="datetimeFigureOut">
               <a:rPr lang="it-IT" noProof="0" smtClean="0"/>
-              <a:t>07/05/2025</a:t>
+              <a:t>08/05/2025</a:t>
             </a:fld>
             <a:endParaRPr lang="it-IT" noProof="0"/>
           </a:p>
@@ -1412,7 +1413,7 @@
           <a:p>
             <a:fld id="{C737C588-2F4A-40D9-9491-0BA83DB7170F}" type="datetimeFigureOut">
               <a:rPr lang="it-IT" smtClean="0"/>
-              <a:t>07/05/2025</a:t>
+              <a:t>08/05/2025</a:t>
             </a:fld>
             <a:endParaRPr lang="it-IT"/>
           </a:p>
@@ -1632,7 +1633,7 @@
           <a:p>
             <a:fld id="{C737C588-2F4A-40D9-9491-0BA83DB7170F}" type="datetimeFigureOut">
               <a:rPr lang="it-IT" smtClean="0"/>
-              <a:t>07/05/2025</a:t>
+              <a:t>08/05/2025</a:t>
             </a:fld>
             <a:endParaRPr lang="it-IT"/>
           </a:p>
@@ -2189,7 +2190,7 @@
                 <a:latin typeface="Calibri" panose="020F0502020204030204" pitchFamily="34" charset="0"/>
                 <a:cs typeface="Calibri" panose="020F0502020204030204" pitchFamily="34" charset="0"/>
               </a:rPr>
-              <a:t>ready-made tools and building blocks</a:t>
+              <a:t>ready-made tools</a:t>
             </a:r>
             <a:r>
               <a:rPr lang="en-US" dirty="0">
@@ -3402,35 +3403,23 @@
           </a:bodyPr>
           <a:lstStyle/>
           <a:p>
-            <a:pPr algn="just"/>
-            <a:r>
-              <a:rPr lang="en-US" dirty="0">
+            <a:pPr lvl="0" eaLnBrk="0" fontAlgn="base" hangingPunct="0">
+              <a:spcBef>
+                <a:spcPct val="0"/>
+              </a:spcBef>
+              <a:spcAft>
+                <a:spcPct val="0"/>
+              </a:spcAft>
+              <a:buFontTx/>
+              <a:buChar char="•"/>
+            </a:pPr>
+            <a:r>
+              <a:rPr lang="en-US" noProof="0" dirty="0">
                 <a:latin typeface="Calibri" panose="020F0502020204030204" pitchFamily="34" charset="0"/>
                 <a:cs typeface="Calibri" panose="020F0502020204030204" pitchFamily="34" charset="0"/>
               </a:rPr>
-              <a:t>You can see it is like a bridge that connects different programs (your Python script vs deep learning framework </a:t>
-            </a:r>
-            <a:r>
-              <a:rPr lang="en-US" dirty="0" err="1">
-                <a:latin typeface="Calibri" panose="020F0502020204030204" pitchFamily="34" charset="0"/>
-                <a:cs typeface="Calibri" panose="020F0502020204030204" pitchFamily="34" charset="0"/>
-              </a:rPr>
-              <a:t>Tensorflow</a:t>
-            </a:r>
-            <a:r>
-              <a:rPr lang="en-US" dirty="0">
-                <a:latin typeface="Calibri" panose="020F0502020204030204" pitchFamily="34" charset="0"/>
-                <a:cs typeface="Calibri" panose="020F0502020204030204" pitchFamily="34" charset="0"/>
-              </a:rPr>
-              <a:t>), allowing them to exchange information and functionality without having to share source code.</a:t>
-            </a:r>
-          </a:p>
-          <a:p>
-            <a:pPr algn="just"/>
-            <a:endParaRPr lang="en-US" dirty="0">
-              <a:latin typeface="Calibri" panose="020F0502020204030204" pitchFamily="34" charset="0"/>
-              <a:cs typeface="Calibri" panose="020F0502020204030204" pitchFamily="34" charset="0"/>
-            </a:endParaRPr>
+              <a:t>It provides a set of easy-to-use commands (functions, classes, tools)</a:t>
+            </a:r>
           </a:p>
           <a:p>
             <a:pPr lvl="0" eaLnBrk="0" fontAlgn="base" hangingPunct="0">
@@ -3448,7 +3437,7 @@
                 <a:latin typeface="Calibri" panose="020F0502020204030204" pitchFamily="34" charset="0"/>
                 <a:cs typeface="Calibri" panose="020F0502020204030204" pitchFamily="34" charset="0"/>
               </a:rPr>
-              <a:t>It provides a set of easy-to-use commands (functions, classes, tools)</a:t>
+              <a:t>You don’t need to understand all the complex math or hardware underneath</a:t>
             </a:r>
           </a:p>
           <a:p>
@@ -3467,7 +3456,7 @@
                 <a:latin typeface="Calibri" panose="020F0502020204030204" pitchFamily="34" charset="0"/>
                 <a:cs typeface="Calibri" panose="020F0502020204030204" pitchFamily="34" charset="0"/>
               </a:rPr>
-              <a:t>You don’t need to understand all the complex math or hardware underneath</a:t>
+              <a:t>You just call the functions, give them your data, and they do the work</a:t>
             </a:r>
           </a:p>
           <a:p>
@@ -3481,13 +3470,45 @@
               <a:buFontTx/>
               <a:buChar char="•"/>
             </a:pPr>
-            <a:r>
-              <a:rPr lang="en-US" noProof="0" dirty="0">
+            <a:endParaRPr lang="en-US" dirty="0">
+              <a:latin typeface="Calibri" panose="020F0502020204030204" pitchFamily="34" charset="0"/>
+              <a:cs typeface="Calibri" panose="020F0502020204030204" pitchFamily="34" charset="0"/>
+            </a:endParaRPr>
+          </a:p>
+          <a:p>
+            <a:pPr eaLnBrk="0" fontAlgn="base" hangingPunct="0">
+              <a:spcBef>
+                <a:spcPct val="0"/>
+              </a:spcBef>
+              <a:spcAft>
+                <a:spcPct val="0"/>
+              </a:spcAft>
+            </a:pPr>
+            <a:r>
+              <a:rPr lang="en-US" dirty="0">
                 <a:latin typeface="Calibri" panose="020F0502020204030204" pitchFamily="34" charset="0"/>
                 <a:cs typeface="Calibri" panose="020F0502020204030204" pitchFamily="34" charset="0"/>
               </a:rPr>
-              <a:t>You just call the functions, give them your data, and they do the work</a:t>
-            </a:r>
+              <a:t>You can see it is like a bridge that connects different programs (your Python script vs deep learning framework </a:t>
+            </a:r>
+            <a:r>
+              <a:rPr lang="en-US" dirty="0" err="1">
+                <a:latin typeface="Calibri" panose="020F0502020204030204" pitchFamily="34" charset="0"/>
+                <a:cs typeface="Calibri" panose="020F0502020204030204" pitchFamily="34" charset="0"/>
+              </a:rPr>
+              <a:t>Tensorflow</a:t>
+            </a:r>
+            <a:r>
+              <a:rPr lang="en-US" dirty="0">
+                <a:latin typeface="Calibri" panose="020F0502020204030204" pitchFamily="34" charset="0"/>
+                <a:cs typeface="Calibri" panose="020F0502020204030204" pitchFamily="34" charset="0"/>
+              </a:rPr>
+              <a:t>), allowing them to exchange information and functionality without having to share source code.</a:t>
+            </a:r>
+            <a:endParaRPr lang="en-US" noProof="0" dirty="0">
+              <a:latin typeface="Calibri" panose="020F0502020204030204" pitchFamily="34" charset="0"/>
+              <a:cs typeface="Calibri" panose="020F0502020204030204" pitchFamily="34" charset="0"/>
+            </a:endParaRPr>
           </a:p>
           <a:p>
             <a:endParaRPr lang="it-IT" dirty="0"/>
@@ -4451,8 +4472,8 @@
             </a:fontRef>
           </p:style>
         </p:cxnSp>
-        <mc:AlternateContent xmlns:mc="http://schemas.openxmlformats.org/markup-compatibility/2006">
-          <mc:Choice xmlns:a14="http://schemas.microsoft.com/office/drawing/2010/main" Requires="a14">
+        <mc:AlternateContent xmlns:mc="http://schemas.openxmlformats.org/markup-compatibility/2006" xmlns:a14="http://schemas.microsoft.com/office/drawing/2010/main">
+          <mc:Choice Requires="a14">
             <p:sp>
               <p:nvSpPr>
                 <p:cNvPr id="70" name="CasellaDiTesto 69">
@@ -4521,7 +4542,7 @@
               </p:txBody>
             </p:sp>
           </mc:Choice>
-          <mc:Fallback>
+          <mc:Fallback xmlns="">
             <p:sp>
               <p:nvSpPr>
                 <p:cNvPr id="70" name="CasellaDiTesto 69">
@@ -4566,8 +4587,8 @@
             </p:sp>
           </mc:Fallback>
         </mc:AlternateContent>
-        <mc:AlternateContent xmlns:mc="http://schemas.openxmlformats.org/markup-compatibility/2006">
-          <mc:Choice xmlns:a14="http://schemas.microsoft.com/office/drawing/2010/main" Requires="a14">
+        <mc:AlternateContent xmlns:mc="http://schemas.openxmlformats.org/markup-compatibility/2006" xmlns:a14="http://schemas.microsoft.com/office/drawing/2010/main">
+          <mc:Choice Requires="a14">
             <p:sp>
               <p:nvSpPr>
                 <p:cNvPr id="90" name="CasellaDiTesto 89">
@@ -4659,7 +4680,7 @@
               </p:txBody>
             </p:sp>
           </mc:Choice>
-          <mc:Fallback>
+          <mc:Fallback xmlns="">
             <p:sp>
               <p:nvSpPr>
                 <p:cNvPr id="90" name="CasellaDiTesto 89">
@@ -6660,8 +6681,8 @@
             </a:p>
           </p:txBody>
         </p:sp>
-        <mc:AlternateContent xmlns:mc="http://schemas.openxmlformats.org/markup-compatibility/2006">
-          <mc:Choice xmlns:a14="http://schemas.microsoft.com/office/drawing/2010/main" Requires="a14">
+        <mc:AlternateContent xmlns:mc="http://schemas.openxmlformats.org/markup-compatibility/2006" xmlns:a14="http://schemas.microsoft.com/office/drawing/2010/main">
+          <mc:Choice Requires="a14">
             <p:sp>
               <p:nvSpPr>
                 <p:cNvPr id="72" name="CasellaDiTesto 71">
@@ -6738,7 +6759,7 @@
               </p:txBody>
             </p:sp>
           </mc:Choice>
-          <mc:Fallback>
+          <mc:Fallback xmlns="">
             <p:sp>
               <p:nvSpPr>
                 <p:cNvPr id="72" name="CasellaDiTesto 71">
@@ -6906,8 +6927,8 @@
             </p:sp>
           </mc:Fallback>
         </mc:AlternateContent>
-        <mc:AlternateContent xmlns:mc="http://schemas.openxmlformats.org/markup-compatibility/2006">
-          <mc:Choice xmlns:a14="http://schemas.microsoft.com/office/drawing/2010/main" Requires="a14">
+        <mc:AlternateContent xmlns:mc="http://schemas.openxmlformats.org/markup-compatibility/2006" xmlns:a14="http://schemas.microsoft.com/office/drawing/2010/main">
+          <mc:Choice Requires="a14">
             <p:sp>
               <p:nvSpPr>
                 <p:cNvPr id="74" name="CasellaDiTesto 73">
@@ -7045,7 +7066,7 @@
               </p:txBody>
             </p:sp>
           </mc:Choice>
-          <mc:Fallback>
+          <mc:Fallback xmlns="">
             <p:sp>
               <p:nvSpPr>
                 <p:cNvPr id="74" name="CasellaDiTesto 73">
@@ -7137,8 +7158,8 @@
             </a:p>
           </p:txBody>
         </p:sp>
-        <mc:AlternateContent xmlns:mc="http://schemas.openxmlformats.org/markup-compatibility/2006">
-          <mc:Choice xmlns:a14="http://schemas.microsoft.com/office/drawing/2010/main" Requires="a14">
+        <mc:AlternateContent xmlns:mc="http://schemas.openxmlformats.org/markup-compatibility/2006" xmlns:a14="http://schemas.microsoft.com/office/drawing/2010/main">
+          <mc:Choice Requires="a14">
             <p:sp>
               <p:nvSpPr>
                 <p:cNvPr id="87" name="CasellaDiTesto 86">
@@ -7276,7 +7297,7 @@
               </p:txBody>
             </p:sp>
           </mc:Choice>
-          <mc:Fallback>
+          <mc:Fallback xmlns="">
             <p:sp>
               <p:nvSpPr>
                 <p:cNvPr id="87" name="CasellaDiTesto 86">
@@ -7321,8 +7342,8 @@
             </p:sp>
           </mc:Fallback>
         </mc:AlternateContent>
-        <mc:AlternateContent xmlns:mc="http://schemas.openxmlformats.org/markup-compatibility/2006">
-          <mc:Choice xmlns:a14="http://schemas.microsoft.com/office/drawing/2010/main" Requires="a14">
+        <mc:AlternateContent xmlns:mc="http://schemas.openxmlformats.org/markup-compatibility/2006" xmlns:a14="http://schemas.microsoft.com/office/drawing/2010/main">
+          <mc:Choice Requires="a14">
             <p:sp>
               <p:nvSpPr>
                 <p:cNvPr id="90" name="CasellaDiTesto 89">
@@ -7452,7 +7473,7 @@
               </p:txBody>
             </p:sp>
           </mc:Choice>
-          <mc:Fallback>
+          <mc:Fallback xmlns="">
             <p:sp>
               <p:nvSpPr>
                 <p:cNvPr id="90" name="CasellaDiTesto 89">
@@ -7586,7 +7607,7 @@
         <p:spPr>
           <a:xfrm>
             <a:off x="2989732" y="4741526"/>
-            <a:ext cx="5551019" cy="1569660"/>
+            <a:ext cx="4568749" cy="2185214"/>
           </a:xfrm>
           <a:prstGeom prst="rect">
             <a:avLst/>
@@ -7634,8 +7655,32 @@
                 <a:latin typeface="Calibri" panose="020F0502020204030204" pitchFamily="34" charset="0"/>
                 <a:cs typeface="Calibri" panose="020F0502020204030204" pitchFamily="34" charset="0"/>
               </a:rPr>
-              <a:t>, even for a small network </a:t>
-            </a:r>
+              <a:t>, even for a small network – </a:t>
+            </a:r>
+            <a:r>
+              <a:rPr lang="en-PH" sz="2000" dirty="0" err="1">
+                <a:latin typeface="Calibri" panose="020F0502020204030204" pitchFamily="34" charset="0"/>
+                <a:cs typeface="Calibri" panose="020F0502020204030204" pitchFamily="34" charset="0"/>
+              </a:rPr>
+              <a:t>Keras</a:t>
+            </a:r>
+            <a:r>
+              <a:rPr lang="en-PH" sz="2000" dirty="0">
+                <a:latin typeface="Calibri" panose="020F0502020204030204" pitchFamily="34" charset="0"/>
+                <a:cs typeface="Calibri" panose="020F0502020204030204" pitchFamily="34" charset="0"/>
+              </a:rPr>
+              <a:t> can help us !!!</a:t>
+            </a:r>
+          </a:p>
+          <a:p>
+            <a:pPr marL="342900" indent="-342900">
+              <a:buFont typeface="Arial" panose="020B0604020202020204" pitchFamily="34" charset="0"/>
+              <a:buChar char="•"/>
+            </a:pPr>
+            <a:endParaRPr lang="en-PH" sz="2000" dirty="0">
+              <a:latin typeface="Calibri" panose="020F0502020204030204" pitchFamily="34" charset="0"/>
+              <a:cs typeface="Calibri" panose="020F0502020204030204" pitchFamily="34" charset="0"/>
+            </a:endParaRPr>
           </a:p>
         </p:txBody>
       </p:sp>
@@ -7712,10 +7757,10 @@
       </p:sp>
       <p:pic>
         <p:nvPicPr>
-          <p:cNvPr id="7" name="Immagine 6">
+          <p:cNvPr id="2" name="Immagine 1">
             <a:extLst>
               <a:ext uri="{FF2B5EF4-FFF2-40B4-BE49-F238E27FC236}">
-                <a16:creationId xmlns:a16="http://schemas.microsoft.com/office/drawing/2014/main" id="{4DDB91D2-3306-1ABD-9078-0C814AE2618F}"/>
+                <a16:creationId xmlns:a16="http://schemas.microsoft.com/office/drawing/2014/main" id="{968F8695-3D9B-63E1-395D-E7CCB1E57959}"/>
               </a:ext>
             </a:extLst>
           </p:cNvPr>
@@ -7725,7 +7770,7 @@
           <p:nvPr/>
         </p:nvPicPr>
         <p:blipFill>
-          <a:blip r:embed="rId6">
+          <a:blip r:embed="rId10">
             <a:extLst>
               <a:ext uri="{28A0092B-C50C-407E-A947-70E740481C1C}">
                 <a14:useLocalDpi xmlns:a14="http://schemas.microsoft.com/office/drawing/2010/main" val="0"/>
@@ -7756,13 +7801,13 @@
   <p:clrMapOvr>
     <a:masterClrMapping/>
   </p:clrMapOvr>
-  <mc:AlternateContent xmlns:mc="http://schemas.openxmlformats.org/markup-compatibility/2006">
-    <mc:Choice xmlns:p14="http://schemas.microsoft.com/office/powerpoint/2010/main" Requires="p14">
+  <mc:AlternateContent xmlns:mc="http://schemas.openxmlformats.org/markup-compatibility/2006" xmlns:p14="http://schemas.microsoft.com/office/powerpoint/2010/main">
+    <mc:Choice Requires="p14">
       <p:transition spd="med" p14:dur="700">
         <p:fade/>
       </p:transition>
     </mc:Choice>
-    <mc:Fallback>
+    <mc:Fallback xmlns="">
       <p:transition spd="med">
         <p:fade/>
       </p:transition>
@@ -8027,96 +8072,1814 @@
   <p:clrMapOvr>
     <a:masterClrMapping/>
   </p:clrMapOvr>
-  <p:timing>
-    <p:tnLst>
-      <p:par>
-        <p:cTn id="1" dur="indefinite" restart="never" nodeType="tmRoot">
-          <p:childTnLst>
-            <p:seq concurrent="1" nextAc="seek">
-              <p:cTn id="2" dur="indefinite" nodeType="mainSeq">
-                <p:childTnLst>
-                  <p:par>
-                    <p:cTn id="3" fill="hold">
-                      <p:stCondLst>
-                        <p:cond delay="indefinite"/>
-                      </p:stCondLst>
-                      <p:childTnLst>
-                        <p:par>
-                          <p:cTn id="4" fill="hold">
-                            <p:stCondLst>
-                              <p:cond delay="0"/>
-                            </p:stCondLst>
-                            <p:childTnLst>
-                              <p:par>
-                                <p:cTn id="5" presetID="10" presetClass="entr" presetSubtype="0" fill="hold" grpId="0" nodeType="clickEffect">
-                                  <p:stCondLst>
-                                    <p:cond delay="0"/>
-                                  </p:stCondLst>
-                                  <p:childTnLst>
-                                    <p:set>
-                                      <p:cBhvr>
-                                        <p:cTn id="6" dur="1" fill="hold">
-                                          <p:stCondLst>
-                                            <p:cond delay="0"/>
-                                          </p:stCondLst>
-                                        </p:cTn>
-                                        <p:tgtEl>
-                                          <p:spTgt spid="5"/>
-                                        </p:tgtEl>
-                                        <p:attrNameLst>
-                                          <p:attrName>style.visibility</p:attrName>
-                                        </p:attrNameLst>
-                                      </p:cBhvr>
-                                      <p:to>
-                                        <p:strVal val="visible"/>
-                                      </p:to>
-                                    </p:set>
-                                    <p:animEffect transition="in" filter="fade">
-                                      <p:cBhvr>
-                                        <p:cTn id="7" dur="500"/>
-                                        <p:tgtEl>
-                                          <p:spTgt spid="5"/>
-                                        </p:tgtEl>
-                                      </p:cBhvr>
-                                    </p:animEffect>
-                                  </p:childTnLst>
-                                </p:cTn>
-                              </p:par>
-                            </p:childTnLst>
-                          </p:cTn>
-                        </p:par>
-                      </p:childTnLst>
-                    </p:cTn>
-                  </p:par>
-                </p:childTnLst>
-              </p:cTn>
-              <p:prevCondLst>
-                <p:cond evt="onPrev" delay="0">
-                  <p:tgtEl>
-                    <p:sldTgt/>
-                  </p:tgtEl>
-                </p:cond>
-              </p:prevCondLst>
-              <p:nextCondLst>
-                <p:cond evt="onNext" delay="0">
-                  <p:tgtEl>
-                    <p:sldTgt/>
-                  </p:tgtEl>
-                </p:cond>
-              </p:nextCondLst>
-            </p:seq>
-          </p:childTnLst>
-        </p:cTn>
-      </p:par>
-    </p:tnLst>
-    <p:bldLst>
-      <p:bldP spid="5" grpId="0"/>
-    </p:bldLst>
-  </p:timing>
 </p:sld>
 </file>
 
 <file path=ppt/slides/slide7.xml><?xml version="1.0" encoding="utf-8"?>
+<p:sld xmlns:a="http://schemas.openxmlformats.org/drawingml/2006/main" xmlns:r="http://schemas.openxmlformats.org/officeDocument/2006/relationships" xmlns:p="http://schemas.openxmlformats.org/presentationml/2006/main">
+  <p:cSld>
+    <p:spTree>
+      <p:nvGrpSpPr>
+        <p:cNvPr id="1" name="">
+          <a:extLst>
+            <a:ext uri="{FF2B5EF4-FFF2-40B4-BE49-F238E27FC236}">
+              <a16:creationId xmlns:a16="http://schemas.microsoft.com/office/drawing/2014/main" id="{FB1A0DE0-3271-AE42-3785-DD83F5E22E12}"/>
+            </a:ext>
+          </a:extLst>
+        </p:cNvPr>
+        <p:cNvGrpSpPr/>
+        <p:nvPr/>
+      </p:nvGrpSpPr>
+      <p:grpSpPr>
+        <a:xfrm>
+          <a:off x="0" y="0"/>
+          <a:ext cx="0" cy="0"/>
+          <a:chOff x="0" y="0"/>
+          <a:chExt cx="0" cy="0"/>
+        </a:xfrm>
+      </p:grpSpPr>
+      <p:grpSp>
+        <p:nvGrpSpPr>
+          <p:cNvPr id="2" name="Gruppo 1">
+            <a:extLst>
+              <a:ext uri="{FF2B5EF4-FFF2-40B4-BE49-F238E27FC236}">
+                <a16:creationId xmlns:a16="http://schemas.microsoft.com/office/drawing/2014/main" id="{C1471C82-7DB4-D726-256C-765F19C9FC3A}"/>
+              </a:ext>
+            </a:extLst>
+          </p:cNvPr>
+          <p:cNvGrpSpPr/>
+          <p:nvPr/>
+        </p:nvGrpSpPr>
+        <p:grpSpPr>
+          <a:xfrm>
+            <a:off x="1092624" y="611866"/>
+            <a:ext cx="3236147" cy="1543690"/>
+            <a:chOff x="2050742" y="1791525"/>
+            <a:chExt cx="5832710" cy="2434246"/>
+          </a:xfrm>
+        </p:grpSpPr>
+        <p:sp>
+          <p:nvSpPr>
+            <p:cNvPr id="9" name="Ovale 8">
+              <a:extLst>
+                <a:ext uri="{FF2B5EF4-FFF2-40B4-BE49-F238E27FC236}">
+                  <a16:creationId xmlns:a16="http://schemas.microsoft.com/office/drawing/2014/main" id="{6407A9C2-0474-2981-7C84-2791E759A5B0}"/>
+                </a:ext>
+              </a:extLst>
+            </p:cNvPr>
+            <p:cNvSpPr/>
+            <p:nvPr/>
+          </p:nvSpPr>
+          <p:spPr>
+            <a:xfrm>
+              <a:off x="5272516" y="2175597"/>
+              <a:ext cx="1625515" cy="1402671"/>
+            </a:xfrm>
+            <a:prstGeom prst="ellipse">
+              <a:avLst/>
+            </a:prstGeom>
+            <a:noFill/>
+          </p:spPr>
+          <p:style>
+            <a:lnRef idx="2">
+              <a:schemeClr val="accent1">
+                <a:shade val="15000"/>
+              </a:schemeClr>
+            </a:lnRef>
+            <a:fillRef idx="1">
+              <a:schemeClr val="accent1"/>
+            </a:fillRef>
+            <a:effectRef idx="0">
+              <a:schemeClr val="accent1"/>
+            </a:effectRef>
+            <a:fontRef idx="minor">
+              <a:schemeClr val="lt1"/>
+            </a:fontRef>
+          </p:style>
+          <p:txBody>
+            <a:bodyPr rtlCol="0" anchor="ctr"/>
+            <a:lstStyle/>
+            <a:p>
+              <a:pPr algn="ctr"/>
+              <a:endParaRPr lang="it-IT"/>
+            </a:p>
+          </p:txBody>
+        </p:sp>
+        <p:cxnSp>
+          <p:nvCxnSpPr>
+            <p:cNvPr id="10" name="Connettore diritto 9">
+              <a:extLst>
+                <a:ext uri="{FF2B5EF4-FFF2-40B4-BE49-F238E27FC236}">
+                  <a16:creationId xmlns:a16="http://schemas.microsoft.com/office/drawing/2014/main" id="{1D7ABBF1-C97B-D384-E9B6-D0473D73B567}"/>
+                </a:ext>
+              </a:extLst>
+            </p:cNvPr>
+            <p:cNvCxnSpPr>
+              <a:cxnSpLocks/>
+            </p:cNvCxnSpPr>
+            <p:nvPr/>
+          </p:nvCxnSpPr>
+          <p:spPr>
+            <a:xfrm>
+              <a:off x="2050742" y="1791525"/>
+              <a:ext cx="3174712" cy="1066743"/>
+            </a:xfrm>
+            <a:prstGeom prst="line">
+              <a:avLst/>
+            </a:prstGeom>
+          </p:spPr>
+          <p:style>
+            <a:lnRef idx="1">
+              <a:schemeClr val="accent1"/>
+            </a:lnRef>
+            <a:fillRef idx="0">
+              <a:schemeClr val="accent1"/>
+            </a:fillRef>
+            <a:effectRef idx="0">
+              <a:schemeClr val="accent1"/>
+            </a:effectRef>
+            <a:fontRef idx="minor">
+              <a:schemeClr val="tx1"/>
+            </a:fontRef>
+          </p:style>
+        </p:cxnSp>
+        <p:cxnSp>
+          <p:nvCxnSpPr>
+            <p:cNvPr id="11" name="Connettore diritto 10">
+              <a:extLst>
+                <a:ext uri="{FF2B5EF4-FFF2-40B4-BE49-F238E27FC236}">
+                  <a16:creationId xmlns:a16="http://schemas.microsoft.com/office/drawing/2014/main" id="{D76EF58D-0A64-4395-93C5-43690001E3BB}"/>
+                </a:ext>
+              </a:extLst>
+            </p:cNvPr>
+            <p:cNvCxnSpPr>
+              <a:cxnSpLocks/>
+            </p:cNvCxnSpPr>
+            <p:nvPr/>
+          </p:nvCxnSpPr>
+          <p:spPr>
+            <a:xfrm>
+              <a:off x="2050742" y="2059619"/>
+              <a:ext cx="3174712" cy="798649"/>
+            </a:xfrm>
+            <a:prstGeom prst="line">
+              <a:avLst/>
+            </a:prstGeom>
+          </p:spPr>
+          <p:style>
+            <a:lnRef idx="1">
+              <a:schemeClr val="accent1"/>
+            </a:lnRef>
+            <a:fillRef idx="0">
+              <a:schemeClr val="accent1"/>
+            </a:fillRef>
+            <a:effectRef idx="0">
+              <a:schemeClr val="accent1"/>
+            </a:effectRef>
+            <a:fontRef idx="minor">
+              <a:schemeClr val="tx1"/>
+            </a:fontRef>
+          </p:style>
+        </p:cxnSp>
+        <p:cxnSp>
+          <p:nvCxnSpPr>
+            <p:cNvPr id="12" name="Connettore diritto 11">
+              <a:extLst>
+                <a:ext uri="{FF2B5EF4-FFF2-40B4-BE49-F238E27FC236}">
+                  <a16:creationId xmlns:a16="http://schemas.microsoft.com/office/drawing/2014/main" id="{BAED5702-71B0-EEE8-4E63-964B7AF1414A}"/>
+                </a:ext>
+              </a:extLst>
+            </p:cNvPr>
+            <p:cNvCxnSpPr>
+              <a:cxnSpLocks/>
+            </p:cNvCxnSpPr>
+            <p:nvPr/>
+          </p:nvCxnSpPr>
+          <p:spPr>
+            <a:xfrm>
+              <a:off x="2050742" y="2334542"/>
+              <a:ext cx="3174712" cy="523726"/>
+            </a:xfrm>
+            <a:prstGeom prst="line">
+              <a:avLst/>
+            </a:prstGeom>
+          </p:spPr>
+          <p:style>
+            <a:lnRef idx="1">
+              <a:schemeClr val="accent1"/>
+            </a:lnRef>
+            <a:fillRef idx="0">
+              <a:schemeClr val="accent1"/>
+            </a:fillRef>
+            <a:effectRef idx="0">
+              <a:schemeClr val="accent1"/>
+            </a:effectRef>
+            <a:fontRef idx="minor">
+              <a:schemeClr val="tx1"/>
+            </a:fontRef>
+          </p:style>
+        </p:cxnSp>
+        <p:cxnSp>
+          <p:nvCxnSpPr>
+            <p:cNvPr id="13" name="Connettore diritto 12">
+              <a:extLst>
+                <a:ext uri="{FF2B5EF4-FFF2-40B4-BE49-F238E27FC236}">
+                  <a16:creationId xmlns:a16="http://schemas.microsoft.com/office/drawing/2014/main" id="{02CC6A02-4218-28C1-80AF-611731F1DE7D}"/>
+                </a:ext>
+              </a:extLst>
+            </p:cNvPr>
+            <p:cNvCxnSpPr>
+              <a:cxnSpLocks/>
+            </p:cNvCxnSpPr>
+            <p:nvPr/>
+          </p:nvCxnSpPr>
+          <p:spPr>
+            <a:xfrm flipV="1">
+              <a:off x="2050742" y="2858268"/>
+              <a:ext cx="3174712" cy="843720"/>
+            </a:xfrm>
+            <a:prstGeom prst="line">
+              <a:avLst/>
+            </a:prstGeom>
+          </p:spPr>
+          <p:style>
+            <a:lnRef idx="1">
+              <a:schemeClr val="accent1"/>
+            </a:lnRef>
+            <a:fillRef idx="0">
+              <a:schemeClr val="accent1"/>
+            </a:fillRef>
+            <a:effectRef idx="0">
+              <a:schemeClr val="accent1"/>
+            </a:effectRef>
+            <a:fontRef idx="minor">
+              <a:schemeClr val="tx1"/>
+            </a:fontRef>
+          </p:style>
+        </p:cxnSp>
+        <p:cxnSp>
+          <p:nvCxnSpPr>
+            <p:cNvPr id="14" name="Connettore diritto 13">
+              <a:extLst>
+                <a:ext uri="{FF2B5EF4-FFF2-40B4-BE49-F238E27FC236}">
+                  <a16:creationId xmlns:a16="http://schemas.microsoft.com/office/drawing/2014/main" id="{CAAA2E9E-4C46-97D0-F3D8-51C1589080B2}"/>
+                </a:ext>
+              </a:extLst>
+            </p:cNvPr>
+            <p:cNvCxnSpPr>
+              <a:cxnSpLocks/>
+            </p:cNvCxnSpPr>
+            <p:nvPr/>
+          </p:nvCxnSpPr>
+          <p:spPr>
+            <a:xfrm flipV="1">
+              <a:off x="2050742" y="2858268"/>
+              <a:ext cx="3174712" cy="1367503"/>
+            </a:xfrm>
+            <a:prstGeom prst="line">
+              <a:avLst/>
+            </a:prstGeom>
+          </p:spPr>
+          <p:style>
+            <a:lnRef idx="1">
+              <a:schemeClr val="accent1"/>
+            </a:lnRef>
+            <a:fillRef idx="0">
+              <a:schemeClr val="accent1"/>
+            </a:fillRef>
+            <a:effectRef idx="0">
+              <a:schemeClr val="accent1"/>
+            </a:effectRef>
+            <a:fontRef idx="minor">
+              <a:schemeClr val="tx1"/>
+            </a:fontRef>
+          </p:style>
+        </p:cxnSp>
+        <p:cxnSp>
+          <p:nvCxnSpPr>
+            <p:cNvPr id="15" name="Connettore diritto 14">
+              <a:extLst>
+                <a:ext uri="{FF2B5EF4-FFF2-40B4-BE49-F238E27FC236}">
+                  <a16:creationId xmlns:a16="http://schemas.microsoft.com/office/drawing/2014/main" id="{F7AB6398-5A82-BB33-2D3B-436339BD90B6}"/>
+                </a:ext>
+              </a:extLst>
+            </p:cNvPr>
+            <p:cNvCxnSpPr>
+              <a:cxnSpLocks/>
+            </p:cNvCxnSpPr>
+            <p:nvPr/>
+          </p:nvCxnSpPr>
+          <p:spPr>
+            <a:xfrm>
+              <a:off x="2050742" y="2607271"/>
+              <a:ext cx="3174712" cy="250997"/>
+            </a:xfrm>
+            <a:prstGeom prst="line">
+              <a:avLst/>
+            </a:prstGeom>
+          </p:spPr>
+          <p:style>
+            <a:lnRef idx="1">
+              <a:schemeClr val="accent1"/>
+            </a:lnRef>
+            <a:fillRef idx="0">
+              <a:schemeClr val="accent1"/>
+            </a:fillRef>
+            <a:effectRef idx="0">
+              <a:schemeClr val="accent1"/>
+            </a:effectRef>
+            <a:fontRef idx="minor">
+              <a:schemeClr val="tx1"/>
+            </a:fontRef>
+          </p:style>
+        </p:cxnSp>
+        <p:cxnSp>
+          <p:nvCxnSpPr>
+            <p:cNvPr id="16" name="Connettore diritto 15">
+              <a:extLst>
+                <a:ext uri="{FF2B5EF4-FFF2-40B4-BE49-F238E27FC236}">
+                  <a16:creationId xmlns:a16="http://schemas.microsoft.com/office/drawing/2014/main" id="{4F872F4A-EB05-1DD1-6AD3-2D15A4DC38C8}"/>
+                </a:ext>
+              </a:extLst>
+            </p:cNvPr>
+            <p:cNvCxnSpPr>
+              <a:cxnSpLocks/>
+            </p:cNvCxnSpPr>
+            <p:nvPr/>
+          </p:nvCxnSpPr>
+          <p:spPr>
+            <a:xfrm flipV="1">
+              <a:off x="2050742" y="2858268"/>
+              <a:ext cx="3174712" cy="1092295"/>
+            </a:xfrm>
+            <a:prstGeom prst="line">
+              <a:avLst/>
+            </a:prstGeom>
+          </p:spPr>
+          <p:style>
+            <a:lnRef idx="1">
+              <a:schemeClr val="accent1"/>
+            </a:lnRef>
+            <a:fillRef idx="0">
+              <a:schemeClr val="accent1"/>
+            </a:fillRef>
+            <a:effectRef idx="0">
+              <a:schemeClr val="accent1"/>
+            </a:effectRef>
+            <a:fontRef idx="minor">
+              <a:schemeClr val="tx1"/>
+            </a:fontRef>
+          </p:style>
+        </p:cxnSp>
+        <p:cxnSp>
+          <p:nvCxnSpPr>
+            <p:cNvPr id="17" name="Connettore diritto 16">
+              <a:extLst>
+                <a:ext uri="{FF2B5EF4-FFF2-40B4-BE49-F238E27FC236}">
+                  <a16:creationId xmlns:a16="http://schemas.microsoft.com/office/drawing/2014/main" id="{26948879-CD45-27D9-0FC6-F559D35019CD}"/>
+                </a:ext>
+              </a:extLst>
+            </p:cNvPr>
+            <p:cNvCxnSpPr>
+              <a:cxnSpLocks/>
+            </p:cNvCxnSpPr>
+            <p:nvPr/>
+          </p:nvCxnSpPr>
+          <p:spPr>
+            <a:xfrm flipV="1">
+              <a:off x="2050742" y="2858268"/>
+              <a:ext cx="3174712" cy="329555"/>
+            </a:xfrm>
+            <a:prstGeom prst="line">
+              <a:avLst/>
+            </a:prstGeom>
+          </p:spPr>
+          <p:style>
+            <a:lnRef idx="1">
+              <a:schemeClr val="accent1"/>
+            </a:lnRef>
+            <a:fillRef idx="0">
+              <a:schemeClr val="accent1"/>
+            </a:fillRef>
+            <a:effectRef idx="0">
+              <a:schemeClr val="accent1"/>
+            </a:effectRef>
+            <a:fontRef idx="minor">
+              <a:schemeClr val="tx1"/>
+            </a:fontRef>
+          </p:style>
+        </p:cxnSp>
+        <p:cxnSp>
+          <p:nvCxnSpPr>
+            <p:cNvPr id="18" name="Connettore diritto 17">
+              <a:extLst>
+                <a:ext uri="{FF2B5EF4-FFF2-40B4-BE49-F238E27FC236}">
+                  <a16:creationId xmlns:a16="http://schemas.microsoft.com/office/drawing/2014/main" id="{604B91C2-9BC4-C8B8-B32F-ED299B28ABE6}"/>
+                </a:ext>
+              </a:extLst>
+            </p:cNvPr>
+            <p:cNvCxnSpPr>
+              <a:cxnSpLocks/>
+            </p:cNvCxnSpPr>
+            <p:nvPr/>
+          </p:nvCxnSpPr>
+          <p:spPr>
+            <a:xfrm flipV="1">
+              <a:off x="2050742" y="2858268"/>
+              <a:ext cx="3174712" cy="19326"/>
+            </a:xfrm>
+            <a:prstGeom prst="line">
+              <a:avLst/>
+            </a:prstGeom>
+          </p:spPr>
+          <p:style>
+            <a:lnRef idx="1">
+              <a:schemeClr val="accent1"/>
+            </a:lnRef>
+            <a:fillRef idx="0">
+              <a:schemeClr val="accent1"/>
+            </a:fillRef>
+            <a:effectRef idx="0">
+              <a:schemeClr val="accent1"/>
+            </a:effectRef>
+            <a:fontRef idx="minor">
+              <a:schemeClr val="tx1"/>
+            </a:fontRef>
+          </p:style>
+        </p:cxnSp>
+        <p:cxnSp>
+          <p:nvCxnSpPr>
+            <p:cNvPr id="19" name="Connettore diritto 18">
+              <a:extLst>
+                <a:ext uri="{FF2B5EF4-FFF2-40B4-BE49-F238E27FC236}">
+                  <a16:creationId xmlns:a16="http://schemas.microsoft.com/office/drawing/2014/main" id="{D13364D6-5908-BCDF-9774-29BBBDD8A102}"/>
+                </a:ext>
+              </a:extLst>
+            </p:cNvPr>
+            <p:cNvCxnSpPr>
+              <a:cxnSpLocks/>
+            </p:cNvCxnSpPr>
+            <p:nvPr/>
+          </p:nvCxnSpPr>
+          <p:spPr>
+            <a:xfrm flipV="1">
+              <a:off x="2050742" y="2858268"/>
+              <a:ext cx="3174712" cy="570732"/>
+            </a:xfrm>
+            <a:prstGeom prst="line">
+              <a:avLst/>
+            </a:prstGeom>
+          </p:spPr>
+          <p:style>
+            <a:lnRef idx="1">
+              <a:schemeClr val="accent1"/>
+            </a:lnRef>
+            <a:fillRef idx="0">
+              <a:schemeClr val="accent1"/>
+            </a:fillRef>
+            <a:effectRef idx="0">
+              <a:schemeClr val="accent1"/>
+            </a:effectRef>
+            <a:fontRef idx="minor">
+              <a:schemeClr val="tx1"/>
+            </a:fontRef>
+          </p:style>
+        </p:cxnSp>
+        <p:cxnSp>
+          <p:nvCxnSpPr>
+            <p:cNvPr id="22" name="Connettore diritto 21">
+              <a:extLst>
+                <a:ext uri="{FF2B5EF4-FFF2-40B4-BE49-F238E27FC236}">
+                  <a16:creationId xmlns:a16="http://schemas.microsoft.com/office/drawing/2014/main" id="{30BF6E54-D35D-5782-1C76-E0CCA8C8AF37}"/>
+                </a:ext>
+              </a:extLst>
+            </p:cNvPr>
+            <p:cNvCxnSpPr>
+              <a:cxnSpLocks/>
+            </p:cNvCxnSpPr>
+            <p:nvPr/>
+          </p:nvCxnSpPr>
+          <p:spPr>
+            <a:xfrm>
+              <a:off x="6945925" y="2858268"/>
+              <a:ext cx="937527" cy="3110"/>
+            </a:xfrm>
+            <a:prstGeom prst="line">
+              <a:avLst/>
+            </a:prstGeom>
+          </p:spPr>
+          <p:style>
+            <a:lnRef idx="1">
+              <a:schemeClr val="accent1"/>
+            </a:lnRef>
+            <a:fillRef idx="0">
+              <a:schemeClr val="accent1"/>
+            </a:fillRef>
+            <a:effectRef idx="0">
+              <a:schemeClr val="accent1"/>
+            </a:effectRef>
+            <a:fontRef idx="minor">
+              <a:schemeClr val="tx1"/>
+            </a:fontRef>
+          </p:style>
+        </p:cxnSp>
+      </p:grpSp>
+      <p:grpSp>
+        <p:nvGrpSpPr>
+          <p:cNvPr id="24" name="Gruppo 23">
+            <a:extLst>
+              <a:ext uri="{FF2B5EF4-FFF2-40B4-BE49-F238E27FC236}">
+                <a16:creationId xmlns:a16="http://schemas.microsoft.com/office/drawing/2014/main" id="{55DC3360-3051-4EF4-E0AB-29E45DFB7D6A}"/>
+              </a:ext>
+            </a:extLst>
+          </p:cNvPr>
+          <p:cNvGrpSpPr/>
+          <p:nvPr/>
+        </p:nvGrpSpPr>
+        <p:grpSpPr>
+          <a:xfrm>
+            <a:off x="1036060" y="2548523"/>
+            <a:ext cx="4123169" cy="1714602"/>
+            <a:chOff x="2011821" y="1448540"/>
+            <a:chExt cx="7549429" cy="3008008"/>
+          </a:xfrm>
+        </p:grpSpPr>
+        <p:sp>
+          <p:nvSpPr>
+            <p:cNvPr id="28" name="Ovale 27">
+              <a:extLst>
+                <a:ext uri="{FF2B5EF4-FFF2-40B4-BE49-F238E27FC236}">
+                  <a16:creationId xmlns:a16="http://schemas.microsoft.com/office/drawing/2014/main" id="{F5F9CE0E-F69D-0B90-2CFC-BF9D091AC862}"/>
+                </a:ext>
+              </a:extLst>
+            </p:cNvPr>
+            <p:cNvSpPr/>
+            <p:nvPr/>
+          </p:nvSpPr>
+          <p:spPr>
+            <a:xfrm>
+              <a:off x="4103350" y="1448540"/>
+              <a:ext cx="1533928" cy="1402671"/>
+            </a:xfrm>
+            <a:prstGeom prst="ellipse">
+              <a:avLst/>
+            </a:prstGeom>
+            <a:noFill/>
+          </p:spPr>
+          <p:style>
+            <a:lnRef idx="2">
+              <a:schemeClr val="accent1">
+                <a:shade val="15000"/>
+              </a:schemeClr>
+            </a:lnRef>
+            <a:fillRef idx="1">
+              <a:schemeClr val="accent1"/>
+            </a:fillRef>
+            <a:effectRef idx="0">
+              <a:schemeClr val="accent1"/>
+            </a:effectRef>
+            <a:fontRef idx="minor">
+              <a:schemeClr val="lt1"/>
+            </a:fontRef>
+          </p:style>
+          <p:txBody>
+            <a:bodyPr rtlCol="0" anchor="ctr"/>
+            <a:lstStyle/>
+            <a:p>
+              <a:pPr algn="ctr"/>
+              <a:endParaRPr lang="it-IT"/>
+            </a:p>
+          </p:txBody>
+        </p:sp>
+        <p:sp>
+          <p:nvSpPr>
+            <p:cNvPr id="29" name="Ovale 28">
+              <a:extLst>
+                <a:ext uri="{FF2B5EF4-FFF2-40B4-BE49-F238E27FC236}">
+                  <a16:creationId xmlns:a16="http://schemas.microsoft.com/office/drawing/2014/main" id="{23D2BB1B-5CC0-29E6-D5F7-B18D877612E0}"/>
+                </a:ext>
+              </a:extLst>
+            </p:cNvPr>
+            <p:cNvSpPr/>
+            <p:nvPr/>
+          </p:nvSpPr>
+          <p:spPr>
+            <a:xfrm>
+              <a:off x="6950314" y="2149875"/>
+              <a:ext cx="1625515" cy="1402671"/>
+            </a:xfrm>
+            <a:prstGeom prst="ellipse">
+              <a:avLst/>
+            </a:prstGeom>
+            <a:noFill/>
+          </p:spPr>
+          <p:style>
+            <a:lnRef idx="2">
+              <a:schemeClr val="accent1">
+                <a:shade val="15000"/>
+              </a:schemeClr>
+            </a:lnRef>
+            <a:fillRef idx="1">
+              <a:schemeClr val="accent1"/>
+            </a:fillRef>
+            <a:effectRef idx="0">
+              <a:schemeClr val="accent1"/>
+            </a:effectRef>
+            <a:fontRef idx="minor">
+              <a:schemeClr val="lt1"/>
+            </a:fontRef>
+          </p:style>
+          <p:txBody>
+            <a:bodyPr rtlCol="0" anchor="ctr"/>
+            <a:lstStyle/>
+            <a:p>
+              <a:pPr algn="ctr"/>
+              <a:endParaRPr lang="it-IT"/>
+            </a:p>
+          </p:txBody>
+        </p:sp>
+        <p:cxnSp>
+          <p:nvCxnSpPr>
+            <p:cNvPr id="30" name="Connettore diritto 29">
+              <a:extLst>
+                <a:ext uri="{FF2B5EF4-FFF2-40B4-BE49-F238E27FC236}">
+                  <a16:creationId xmlns:a16="http://schemas.microsoft.com/office/drawing/2014/main" id="{B9617209-E0E2-6C8B-D2AF-F42286C5E079}"/>
+                </a:ext>
+              </a:extLst>
+            </p:cNvPr>
+            <p:cNvCxnSpPr>
+              <a:cxnSpLocks/>
+              <a:endCxn id="28" idx="2"/>
+            </p:cNvCxnSpPr>
+            <p:nvPr/>
+          </p:nvCxnSpPr>
+          <p:spPr>
+            <a:xfrm>
+              <a:off x="2050742" y="1791525"/>
+              <a:ext cx="2052608" cy="358351"/>
+            </a:xfrm>
+            <a:prstGeom prst="line">
+              <a:avLst/>
+            </a:prstGeom>
+          </p:spPr>
+          <p:style>
+            <a:lnRef idx="1">
+              <a:schemeClr val="accent1"/>
+            </a:lnRef>
+            <a:fillRef idx="0">
+              <a:schemeClr val="accent1"/>
+            </a:fillRef>
+            <a:effectRef idx="0">
+              <a:schemeClr val="accent1"/>
+            </a:effectRef>
+            <a:fontRef idx="minor">
+              <a:schemeClr val="tx1"/>
+            </a:fontRef>
+          </p:style>
+        </p:cxnSp>
+        <p:cxnSp>
+          <p:nvCxnSpPr>
+            <p:cNvPr id="31" name="Connettore diritto 30">
+              <a:extLst>
+                <a:ext uri="{FF2B5EF4-FFF2-40B4-BE49-F238E27FC236}">
+                  <a16:creationId xmlns:a16="http://schemas.microsoft.com/office/drawing/2014/main" id="{D2511645-D357-E455-90E4-16C301B70C5D}"/>
+                </a:ext>
+              </a:extLst>
+            </p:cNvPr>
+            <p:cNvCxnSpPr>
+              <a:cxnSpLocks/>
+              <a:endCxn id="28" idx="2"/>
+            </p:cNvCxnSpPr>
+            <p:nvPr/>
+          </p:nvCxnSpPr>
+          <p:spPr>
+            <a:xfrm>
+              <a:off x="2050742" y="2059619"/>
+              <a:ext cx="2052608" cy="90257"/>
+            </a:xfrm>
+            <a:prstGeom prst="line">
+              <a:avLst/>
+            </a:prstGeom>
+          </p:spPr>
+          <p:style>
+            <a:lnRef idx="1">
+              <a:schemeClr val="accent1"/>
+            </a:lnRef>
+            <a:fillRef idx="0">
+              <a:schemeClr val="accent1"/>
+            </a:fillRef>
+            <a:effectRef idx="0">
+              <a:schemeClr val="accent1"/>
+            </a:effectRef>
+            <a:fontRef idx="minor">
+              <a:schemeClr val="tx1"/>
+            </a:fontRef>
+          </p:style>
+        </p:cxnSp>
+        <p:cxnSp>
+          <p:nvCxnSpPr>
+            <p:cNvPr id="32" name="Connettore diritto 31">
+              <a:extLst>
+                <a:ext uri="{FF2B5EF4-FFF2-40B4-BE49-F238E27FC236}">
+                  <a16:creationId xmlns:a16="http://schemas.microsoft.com/office/drawing/2014/main" id="{BCFB8D75-F69D-F3F9-EEA4-C729A88DB18E}"/>
+                </a:ext>
+              </a:extLst>
+            </p:cNvPr>
+            <p:cNvCxnSpPr>
+              <a:cxnSpLocks/>
+              <a:endCxn id="28" idx="2"/>
+            </p:cNvCxnSpPr>
+            <p:nvPr/>
+          </p:nvCxnSpPr>
+          <p:spPr>
+            <a:xfrm flipV="1">
+              <a:off x="2050742" y="2149876"/>
+              <a:ext cx="2052608" cy="184666"/>
+            </a:xfrm>
+            <a:prstGeom prst="line">
+              <a:avLst/>
+            </a:prstGeom>
+          </p:spPr>
+          <p:style>
+            <a:lnRef idx="1">
+              <a:schemeClr val="accent1"/>
+            </a:lnRef>
+            <a:fillRef idx="0">
+              <a:schemeClr val="accent1"/>
+            </a:fillRef>
+            <a:effectRef idx="0">
+              <a:schemeClr val="accent1"/>
+            </a:effectRef>
+            <a:fontRef idx="minor">
+              <a:schemeClr val="tx1"/>
+            </a:fontRef>
+          </p:style>
+        </p:cxnSp>
+        <p:cxnSp>
+          <p:nvCxnSpPr>
+            <p:cNvPr id="33" name="Connettore diritto 32">
+              <a:extLst>
+                <a:ext uri="{FF2B5EF4-FFF2-40B4-BE49-F238E27FC236}">
+                  <a16:creationId xmlns:a16="http://schemas.microsoft.com/office/drawing/2014/main" id="{F571574E-B197-39F1-AA78-71D60CFBC7C6}"/>
+                </a:ext>
+              </a:extLst>
+            </p:cNvPr>
+            <p:cNvCxnSpPr>
+              <a:cxnSpLocks/>
+              <a:endCxn id="28" idx="2"/>
+            </p:cNvCxnSpPr>
+            <p:nvPr/>
+          </p:nvCxnSpPr>
+          <p:spPr>
+            <a:xfrm flipV="1">
+              <a:off x="2050742" y="2149876"/>
+              <a:ext cx="2052608" cy="1552112"/>
+            </a:xfrm>
+            <a:prstGeom prst="line">
+              <a:avLst/>
+            </a:prstGeom>
+          </p:spPr>
+          <p:style>
+            <a:lnRef idx="1">
+              <a:schemeClr val="accent1"/>
+            </a:lnRef>
+            <a:fillRef idx="0">
+              <a:schemeClr val="accent1"/>
+            </a:fillRef>
+            <a:effectRef idx="0">
+              <a:schemeClr val="accent1"/>
+            </a:effectRef>
+            <a:fontRef idx="minor">
+              <a:schemeClr val="tx1"/>
+            </a:fontRef>
+          </p:style>
+        </p:cxnSp>
+        <p:cxnSp>
+          <p:nvCxnSpPr>
+            <p:cNvPr id="34" name="Connettore diritto 33">
+              <a:extLst>
+                <a:ext uri="{FF2B5EF4-FFF2-40B4-BE49-F238E27FC236}">
+                  <a16:creationId xmlns:a16="http://schemas.microsoft.com/office/drawing/2014/main" id="{6E813D8D-D48D-04E8-F5F3-B301857FF6CF}"/>
+                </a:ext>
+              </a:extLst>
+            </p:cNvPr>
+            <p:cNvCxnSpPr>
+              <a:cxnSpLocks/>
+              <a:endCxn id="28" idx="2"/>
+            </p:cNvCxnSpPr>
+            <p:nvPr/>
+          </p:nvCxnSpPr>
+          <p:spPr>
+            <a:xfrm flipV="1">
+              <a:off x="2050742" y="2149876"/>
+              <a:ext cx="2052608" cy="2075895"/>
+            </a:xfrm>
+            <a:prstGeom prst="line">
+              <a:avLst/>
+            </a:prstGeom>
+          </p:spPr>
+          <p:style>
+            <a:lnRef idx="1">
+              <a:schemeClr val="accent1"/>
+            </a:lnRef>
+            <a:fillRef idx="0">
+              <a:schemeClr val="accent1"/>
+            </a:fillRef>
+            <a:effectRef idx="0">
+              <a:schemeClr val="accent1"/>
+            </a:effectRef>
+            <a:fontRef idx="minor">
+              <a:schemeClr val="tx1"/>
+            </a:fontRef>
+          </p:style>
+        </p:cxnSp>
+        <p:cxnSp>
+          <p:nvCxnSpPr>
+            <p:cNvPr id="35" name="Connettore diritto 34">
+              <a:extLst>
+                <a:ext uri="{FF2B5EF4-FFF2-40B4-BE49-F238E27FC236}">
+                  <a16:creationId xmlns:a16="http://schemas.microsoft.com/office/drawing/2014/main" id="{26091C0E-1DE4-02E0-08CC-65AFC64E9EE6}"/>
+                </a:ext>
+              </a:extLst>
+            </p:cNvPr>
+            <p:cNvCxnSpPr>
+              <a:cxnSpLocks/>
+            </p:cNvCxnSpPr>
+            <p:nvPr/>
+          </p:nvCxnSpPr>
+          <p:spPr>
+            <a:xfrm>
+              <a:off x="2050742" y="2610035"/>
+              <a:ext cx="2052607" cy="1175487"/>
+            </a:xfrm>
+            <a:prstGeom prst="line">
+              <a:avLst/>
+            </a:prstGeom>
+          </p:spPr>
+          <p:style>
+            <a:lnRef idx="1">
+              <a:schemeClr val="accent1"/>
+            </a:lnRef>
+            <a:fillRef idx="0">
+              <a:schemeClr val="accent1"/>
+            </a:fillRef>
+            <a:effectRef idx="0">
+              <a:schemeClr val="accent1"/>
+            </a:effectRef>
+            <a:fontRef idx="minor">
+              <a:schemeClr val="tx1"/>
+            </a:fontRef>
+          </p:style>
+        </p:cxnSp>
+        <p:cxnSp>
+          <p:nvCxnSpPr>
+            <p:cNvPr id="36" name="Connettore diritto 35">
+              <a:extLst>
+                <a:ext uri="{FF2B5EF4-FFF2-40B4-BE49-F238E27FC236}">
+                  <a16:creationId xmlns:a16="http://schemas.microsoft.com/office/drawing/2014/main" id="{E1DBDBD0-2B94-2675-A39B-83463422AAB9}"/>
+                </a:ext>
+              </a:extLst>
+            </p:cNvPr>
+            <p:cNvCxnSpPr>
+              <a:cxnSpLocks/>
+              <a:endCxn id="28" idx="2"/>
+            </p:cNvCxnSpPr>
+            <p:nvPr/>
+          </p:nvCxnSpPr>
+          <p:spPr>
+            <a:xfrm flipV="1">
+              <a:off x="2050742" y="2149876"/>
+              <a:ext cx="2052608" cy="457395"/>
+            </a:xfrm>
+            <a:prstGeom prst="line">
+              <a:avLst/>
+            </a:prstGeom>
+          </p:spPr>
+          <p:style>
+            <a:lnRef idx="1">
+              <a:schemeClr val="accent1"/>
+            </a:lnRef>
+            <a:fillRef idx="0">
+              <a:schemeClr val="accent1"/>
+            </a:fillRef>
+            <a:effectRef idx="0">
+              <a:schemeClr val="accent1"/>
+            </a:effectRef>
+            <a:fontRef idx="minor">
+              <a:schemeClr val="tx1"/>
+            </a:fontRef>
+          </p:style>
+        </p:cxnSp>
+        <p:cxnSp>
+          <p:nvCxnSpPr>
+            <p:cNvPr id="37" name="Connettore diritto 36">
+              <a:extLst>
+                <a:ext uri="{FF2B5EF4-FFF2-40B4-BE49-F238E27FC236}">
+                  <a16:creationId xmlns:a16="http://schemas.microsoft.com/office/drawing/2014/main" id="{9D8E03A0-28F0-7193-B021-C344CC922100}"/>
+                </a:ext>
+              </a:extLst>
+            </p:cNvPr>
+            <p:cNvCxnSpPr>
+              <a:cxnSpLocks/>
+            </p:cNvCxnSpPr>
+            <p:nvPr/>
+          </p:nvCxnSpPr>
+          <p:spPr>
+            <a:xfrm flipV="1">
+              <a:off x="2050742" y="3785522"/>
+              <a:ext cx="2052607" cy="165041"/>
+            </a:xfrm>
+            <a:prstGeom prst="line">
+              <a:avLst/>
+            </a:prstGeom>
+          </p:spPr>
+          <p:style>
+            <a:lnRef idx="1">
+              <a:schemeClr val="accent1"/>
+            </a:lnRef>
+            <a:fillRef idx="0">
+              <a:schemeClr val="accent1"/>
+            </a:fillRef>
+            <a:effectRef idx="0">
+              <a:schemeClr val="accent1"/>
+            </a:effectRef>
+            <a:fontRef idx="minor">
+              <a:schemeClr val="tx1"/>
+            </a:fontRef>
+          </p:style>
+        </p:cxnSp>
+        <p:cxnSp>
+          <p:nvCxnSpPr>
+            <p:cNvPr id="38" name="Connettore diritto 37">
+              <a:extLst>
+                <a:ext uri="{FF2B5EF4-FFF2-40B4-BE49-F238E27FC236}">
+                  <a16:creationId xmlns:a16="http://schemas.microsoft.com/office/drawing/2014/main" id="{DD7C3A5D-E30F-00B1-A31F-4B4289582B36}"/>
+                </a:ext>
+              </a:extLst>
+            </p:cNvPr>
+            <p:cNvCxnSpPr>
+              <a:cxnSpLocks/>
+            </p:cNvCxnSpPr>
+            <p:nvPr/>
+          </p:nvCxnSpPr>
+          <p:spPr>
+            <a:xfrm flipV="1">
+              <a:off x="2050742" y="3785522"/>
+              <a:ext cx="2052607" cy="474151"/>
+            </a:xfrm>
+            <a:prstGeom prst="line">
+              <a:avLst/>
+            </a:prstGeom>
+          </p:spPr>
+          <p:style>
+            <a:lnRef idx="1">
+              <a:schemeClr val="accent1"/>
+            </a:lnRef>
+            <a:fillRef idx="0">
+              <a:schemeClr val="accent1"/>
+            </a:fillRef>
+            <a:effectRef idx="0">
+              <a:schemeClr val="accent1"/>
+            </a:effectRef>
+            <a:fontRef idx="minor">
+              <a:schemeClr val="tx1"/>
+            </a:fontRef>
+          </p:style>
+        </p:cxnSp>
+        <p:cxnSp>
+          <p:nvCxnSpPr>
+            <p:cNvPr id="39" name="Connettore diritto 38">
+              <a:extLst>
+                <a:ext uri="{FF2B5EF4-FFF2-40B4-BE49-F238E27FC236}">
+                  <a16:creationId xmlns:a16="http://schemas.microsoft.com/office/drawing/2014/main" id="{7D35619F-81CF-782D-A9D4-C1749C6B5C03}"/>
+                </a:ext>
+              </a:extLst>
+            </p:cNvPr>
+            <p:cNvCxnSpPr>
+              <a:cxnSpLocks/>
+              <a:endCxn id="28" idx="2"/>
+            </p:cNvCxnSpPr>
+            <p:nvPr/>
+          </p:nvCxnSpPr>
+          <p:spPr>
+            <a:xfrm flipV="1">
+              <a:off x="2050742" y="2149876"/>
+              <a:ext cx="2052608" cy="1800687"/>
+            </a:xfrm>
+            <a:prstGeom prst="line">
+              <a:avLst/>
+            </a:prstGeom>
+          </p:spPr>
+          <p:style>
+            <a:lnRef idx="1">
+              <a:schemeClr val="accent1"/>
+            </a:lnRef>
+            <a:fillRef idx="0">
+              <a:schemeClr val="accent1"/>
+            </a:fillRef>
+            <a:effectRef idx="0">
+              <a:schemeClr val="accent1"/>
+            </a:effectRef>
+            <a:fontRef idx="minor">
+              <a:schemeClr val="tx1"/>
+            </a:fontRef>
+          </p:style>
+        </p:cxnSp>
+        <p:cxnSp>
+          <p:nvCxnSpPr>
+            <p:cNvPr id="40" name="Connettore diritto 39">
+              <a:extLst>
+                <a:ext uri="{FF2B5EF4-FFF2-40B4-BE49-F238E27FC236}">
+                  <a16:creationId xmlns:a16="http://schemas.microsoft.com/office/drawing/2014/main" id="{DBAA27C0-816B-236A-DC12-0CA3A0748C47}"/>
+                </a:ext>
+              </a:extLst>
+            </p:cNvPr>
+            <p:cNvCxnSpPr>
+              <a:cxnSpLocks/>
+            </p:cNvCxnSpPr>
+            <p:nvPr/>
+          </p:nvCxnSpPr>
+          <p:spPr>
+            <a:xfrm>
+              <a:off x="2050742" y="3673592"/>
+              <a:ext cx="2052607" cy="111930"/>
+            </a:xfrm>
+            <a:prstGeom prst="line">
+              <a:avLst/>
+            </a:prstGeom>
+          </p:spPr>
+          <p:style>
+            <a:lnRef idx="1">
+              <a:schemeClr val="accent1"/>
+            </a:lnRef>
+            <a:fillRef idx="0">
+              <a:schemeClr val="accent1"/>
+            </a:fillRef>
+            <a:effectRef idx="0">
+              <a:schemeClr val="accent1"/>
+            </a:effectRef>
+            <a:fontRef idx="minor">
+              <a:schemeClr val="tx1"/>
+            </a:fontRef>
+          </p:style>
+        </p:cxnSp>
+        <p:cxnSp>
+          <p:nvCxnSpPr>
+            <p:cNvPr id="41" name="Connettore diritto 40">
+              <a:extLst>
+                <a:ext uri="{FF2B5EF4-FFF2-40B4-BE49-F238E27FC236}">
+                  <a16:creationId xmlns:a16="http://schemas.microsoft.com/office/drawing/2014/main" id="{75F48803-CE44-891F-B3CF-A826F563BE8E}"/>
+                </a:ext>
+              </a:extLst>
+            </p:cNvPr>
+            <p:cNvCxnSpPr>
+              <a:cxnSpLocks/>
+            </p:cNvCxnSpPr>
+            <p:nvPr/>
+          </p:nvCxnSpPr>
+          <p:spPr>
+            <a:xfrm>
+              <a:off x="2050742" y="3429000"/>
+              <a:ext cx="2052607" cy="356522"/>
+            </a:xfrm>
+            <a:prstGeom prst="line">
+              <a:avLst/>
+            </a:prstGeom>
+          </p:spPr>
+          <p:style>
+            <a:lnRef idx="1">
+              <a:schemeClr val="accent1"/>
+            </a:lnRef>
+            <a:fillRef idx="0">
+              <a:schemeClr val="accent1"/>
+            </a:fillRef>
+            <a:effectRef idx="0">
+              <a:schemeClr val="accent1"/>
+            </a:effectRef>
+            <a:fontRef idx="minor">
+              <a:schemeClr val="tx1"/>
+            </a:fontRef>
+          </p:style>
+        </p:cxnSp>
+        <p:cxnSp>
+          <p:nvCxnSpPr>
+            <p:cNvPr id="42" name="Connettore diritto 41">
+              <a:extLst>
+                <a:ext uri="{FF2B5EF4-FFF2-40B4-BE49-F238E27FC236}">
+                  <a16:creationId xmlns:a16="http://schemas.microsoft.com/office/drawing/2014/main" id="{849C2980-8F81-0FD7-610D-72A60FABC7F6}"/>
+                </a:ext>
+              </a:extLst>
+            </p:cNvPr>
+            <p:cNvCxnSpPr>
+              <a:cxnSpLocks/>
+              <a:endCxn id="28" idx="2"/>
+            </p:cNvCxnSpPr>
+            <p:nvPr/>
+          </p:nvCxnSpPr>
+          <p:spPr>
+            <a:xfrm flipV="1">
+              <a:off x="2050742" y="2149876"/>
+              <a:ext cx="2052608" cy="1037947"/>
+            </a:xfrm>
+            <a:prstGeom prst="line">
+              <a:avLst/>
+            </a:prstGeom>
+          </p:spPr>
+          <p:style>
+            <a:lnRef idx="1">
+              <a:schemeClr val="accent1"/>
+            </a:lnRef>
+            <a:fillRef idx="0">
+              <a:schemeClr val="accent1"/>
+            </a:fillRef>
+            <a:effectRef idx="0">
+              <a:schemeClr val="accent1"/>
+            </a:effectRef>
+            <a:fontRef idx="minor">
+              <a:schemeClr val="tx1"/>
+            </a:fontRef>
+          </p:style>
+        </p:cxnSp>
+        <p:cxnSp>
+          <p:nvCxnSpPr>
+            <p:cNvPr id="43" name="Connettore diritto 42">
+              <a:extLst>
+                <a:ext uri="{FF2B5EF4-FFF2-40B4-BE49-F238E27FC236}">
+                  <a16:creationId xmlns:a16="http://schemas.microsoft.com/office/drawing/2014/main" id="{0DBA8388-3702-17F9-B7F0-F686280F79E9}"/>
+                </a:ext>
+              </a:extLst>
+            </p:cNvPr>
+            <p:cNvCxnSpPr>
+              <a:cxnSpLocks/>
+            </p:cNvCxnSpPr>
+            <p:nvPr/>
+          </p:nvCxnSpPr>
+          <p:spPr>
+            <a:xfrm>
+              <a:off x="2050742" y="2864898"/>
+              <a:ext cx="2052607" cy="920624"/>
+            </a:xfrm>
+            <a:prstGeom prst="line">
+              <a:avLst/>
+            </a:prstGeom>
+          </p:spPr>
+          <p:style>
+            <a:lnRef idx="1">
+              <a:schemeClr val="accent1"/>
+            </a:lnRef>
+            <a:fillRef idx="0">
+              <a:schemeClr val="accent1"/>
+            </a:fillRef>
+            <a:effectRef idx="0">
+              <a:schemeClr val="accent1"/>
+            </a:effectRef>
+            <a:fontRef idx="minor">
+              <a:schemeClr val="tx1"/>
+            </a:fontRef>
+          </p:style>
+        </p:cxnSp>
+        <p:cxnSp>
+          <p:nvCxnSpPr>
+            <p:cNvPr id="44" name="Connettore diritto 43">
+              <a:extLst>
+                <a:ext uri="{FF2B5EF4-FFF2-40B4-BE49-F238E27FC236}">
+                  <a16:creationId xmlns:a16="http://schemas.microsoft.com/office/drawing/2014/main" id="{8BC4B354-A858-5EB0-B454-B1AA6AB993A2}"/>
+                </a:ext>
+              </a:extLst>
+            </p:cNvPr>
+            <p:cNvCxnSpPr>
+              <a:cxnSpLocks/>
+            </p:cNvCxnSpPr>
+            <p:nvPr/>
+          </p:nvCxnSpPr>
+          <p:spPr>
+            <a:xfrm>
+              <a:off x="2050742" y="2033236"/>
+              <a:ext cx="2052607" cy="1752286"/>
+            </a:xfrm>
+            <a:prstGeom prst="line">
+              <a:avLst/>
+            </a:prstGeom>
+          </p:spPr>
+          <p:style>
+            <a:lnRef idx="1">
+              <a:schemeClr val="accent1"/>
+            </a:lnRef>
+            <a:fillRef idx="0">
+              <a:schemeClr val="accent1"/>
+            </a:fillRef>
+            <a:effectRef idx="0">
+              <a:schemeClr val="accent1"/>
+            </a:effectRef>
+            <a:fontRef idx="minor">
+              <a:schemeClr val="tx1"/>
+            </a:fontRef>
+          </p:style>
+        </p:cxnSp>
+        <p:cxnSp>
+          <p:nvCxnSpPr>
+            <p:cNvPr id="45" name="Connettore diritto 44">
+              <a:extLst>
+                <a:ext uri="{FF2B5EF4-FFF2-40B4-BE49-F238E27FC236}">
+                  <a16:creationId xmlns:a16="http://schemas.microsoft.com/office/drawing/2014/main" id="{63AD8F02-30F2-27FE-8C5D-6D25350F0957}"/>
+                </a:ext>
+              </a:extLst>
+            </p:cNvPr>
+            <p:cNvCxnSpPr>
+              <a:cxnSpLocks/>
+            </p:cNvCxnSpPr>
+            <p:nvPr/>
+          </p:nvCxnSpPr>
+          <p:spPr>
+            <a:xfrm>
+              <a:off x="2011821" y="1791525"/>
+              <a:ext cx="2091528" cy="1993997"/>
+            </a:xfrm>
+            <a:prstGeom prst="line">
+              <a:avLst/>
+            </a:prstGeom>
+          </p:spPr>
+          <p:style>
+            <a:lnRef idx="1">
+              <a:schemeClr val="accent1"/>
+            </a:lnRef>
+            <a:fillRef idx="0">
+              <a:schemeClr val="accent1"/>
+            </a:fillRef>
+            <a:effectRef idx="0">
+              <a:schemeClr val="accent1"/>
+            </a:effectRef>
+            <a:fontRef idx="minor">
+              <a:schemeClr val="tx1"/>
+            </a:fontRef>
+          </p:style>
+        </p:cxnSp>
+        <p:cxnSp>
+          <p:nvCxnSpPr>
+            <p:cNvPr id="46" name="Connettore diritto 45">
+              <a:extLst>
+                <a:ext uri="{FF2B5EF4-FFF2-40B4-BE49-F238E27FC236}">
+                  <a16:creationId xmlns:a16="http://schemas.microsoft.com/office/drawing/2014/main" id="{980F7855-D2F8-0A51-3C64-44531AF3DAA1}"/>
+                </a:ext>
+              </a:extLst>
+            </p:cNvPr>
+            <p:cNvCxnSpPr>
+              <a:cxnSpLocks/>
+            </p:cNvCxnSpPr>
+            <p:nvPr/>
+          </p:nvCxnSpPr>
+          <p:spPr>
+            <a:xfrm>
+              <a:off x="2050742" y="3187823"/>
+              <a:ext cx="2052607" cy="597699"/>
+            </a:xfrm>
+            <a:prstGeom prst="line">
+              <a:avLst/>
+            </a:prstGeom>
+          </p:spPr>
+          <p:style>
+            <a:lnRef idx="1">
+              <a:schemeClr val="accent1"/>
+            </a:lnRef>
+            <a:fillRef idx="0">
+              <a:schemeClr val="accent1"/>
+            </a:fillRef>
+            <a:effectRef idx="0">
+              <a:schemeClr val="accent1"/>
+            </a:effectRef>
+            <a:fontRef idx="minor">
+              <a:schemeClr val="tx1"/>
+            </a:fontRef>
+          </p:style>
+        </p:cxnSp>
+        <p:cxnSp>
+          <p:nvCxnSpPr>
+            <p:cNvPr id="47" name="Connettore diritto 46">
+              <a:extLst>
+                <a:ext uri="{FF2B5EF4-FFF2-40B4-BE49-F238E27FC236}">
+                  <a16:creationId xmlns:a16="http://schemas.microsoft.com/office/drawing/2014/main" id="{F0174567-45A1-0A12-8B61-8F594ED70805}"/>
+                </a:ext>
+              </a:extLst>
+            </p:cNvPr>
+            <p:cNvCxnSpPr>
+              <a:cxnSpLocks/>
+              <a:endCxn id="28" idx="2"/>
+            </p:cNvCxnSpPr>
+            <p:nvPr/>
+          </p:nvCxnSpPr>
+          <p:spPr>
+            <a:xfrm flipV="1">
+              <a:off x="2050742" y="2149876"/>
+              <a:ext cx="2052608" cy="727718"/>
+            </a:xfrm>
+            <a:prstGeom prst="line">
+              <a:avLst/>
+            </a:prstGeom>
+          </p:spPr>
+          <p:style>
+            <a:lnRef idx="1">
+              <a:schemeClr val="accent1"/>
+            </a:lnRef>
+            <a:fillRef idx="0">
+              <a:schemeClr val="accent1"/>
+            </a:fillRef>
+            <a:effectRef idx="0">
+              <a:schemeClr val="accent1"/>
+            </a:effectRef>
+            <a:fontRef idx="minor">
+              <a:schemeClr val="tx1"/>
+            </a:fontRef>
+          </p:style>
+        </p:cxnSp>
+        <p:cxnSp>
+          <p:nvCxnSpPr>
+            <p:cNvPr id="48" name="Connettore diritto 47">
+              <a:extLst>
+                <a:ext uri="{FF2B5EF4-FFF2-40B4-BE49-F238E27FC236}">
+                  <a16:creationId xmlns:a16="http://schemas.microsoft.com/office/drawing/2014/main" id="{7A683135-F116-D446-BF08-332EED8D0390}"/>
+                </a:ext>
+              </a:extLst>
+            </p:cNvPr>
+            <p:cNvCxnSpPr>
+              <a:cxnSpLocks/>
+            </p:cNvCxnSpPr>
+            <p:nvPr/>
+          </p:nvCxnSpPr>
+          <p:spPr>
+            <a:xfrm>
+              <a:off x="2050742" y="2329547"/>
+              <a:ext cx="2052607" cy="1455975"/>
+            </a:xfrm>
+            <a:prstGeom prst="line">
+              <a:avLst/>
+            </a:prstGeom>
+          </p:spPr>
+          <p:style>
+            <a:lnRef idx="1">
+              <a:schemeClr val="accent1"/>
+            </a:lnRef>
+            <a:fillRef idx="0">
+              <a:schemeClr val="accent1"/>
+            </a:fillRef>
+            <a:effectRef idx="0">
+              <a:schemeClr val="accent1"/>
+            </a:effectRef>
+            <a:fontRef idx="minor">
+              <a:schemeClr val="tx1"/>
+            </a:fontRef>
+          </p:style>
+        </p:cxnSp>
+        <p:cxnSp>
+          <p:nvCxnSpPr>
+            <p:cNvPr id="49" name="Connettore diritto 48">
+              <a:extLst>
+                <a:ext uri="{FF2B5EF4-FFF2-40B4-BE49-F238E27FC236}">
+                  <a16:creationId xmlns:a16="http://schemas.microsoft.com/office/drawing/2014/main" id="{4140C8F2-9E3C-9C19-1869-5A2B70DA87C1}"/>
+                </a:ext>
+              </a:extLst>
+            </p:cNvPr>
+            <p:cNvCxnSpPr>
+              <a:cxnSpLocks/>
+              <a:endCxn id="28" idx="2"/>
+            </p:cNvCxnSpPr>
+            <p:nvPr/>
+          </p:nvCxnSpPr>
+          <p:spPr>
+            <a:xfrm flipV="1">
+              <a:off x="2050742" y="2149876"/>
+              <a:ext cx="2052608" cy="1279124"/>
+            </a:xfrm>
+            <a:prstGeom prst="line">
+              <a:avLst/>
+            </a:prstGeom>
+          </p:spPr>
+          <p:style>
+            <a:lnRef idx="1">
+              <a:schemeClr val="accent1"/>
+            </a:lnRef>
+            <a:fillRef idx="0">
+              <a:schemeClr val="accent1"/>
+            </a:fillRef>
+            <a:effectRef idx="0">
+              <a:schemeClr val="accent1"/>
+            </a:effectRef>
+            <a:fontRef idx="minor">
+              <a:schemeClr val="tx1"/>
+            </a:fontRef>
+          </p:style>
+        </p:cxnSp>
+        <p:cxnSp>
+          <p:nvCxnSpPr>
+            <p:cNvPr id="50" name="Connettore diritto 49">
+              <a:extLst>
+                <a:ext uri="{FF2B5EF4-FFF2-40B4-BE49-F238E27FC236}">
+                  <a16:creationId xmlns:a16="http://schemas.microsoft.com/office/drawing/2014/main" id="{590AC457-DD71-73FC-B7EA-A884FB19E577}"/>
+                </a:ext>
+              </a:extLst>
+            </p:cNvPr>
+            <p:cNvCxnSpPr>
+              <a:cxnSpLocks/>
+              <a:stCxn id="28" idx="6"/>
+              <a:endCxn id="29" idx="2"/>
+            </p:cNvCxnSpPr>
+            <p:nvPr/>
+          </p:nvCxnSpPr>
+          <p:spPr>
+            <a:xfrm>
+              <a:off x="5637278" y="2149876"/>
+              <a:ext cx="1313036" cy="701335"/>
+            </a:xfrm>
+            <a:prstGeom prst="line">
+              <a:avLst/>
+            </a:prstGeom>
+          </p:spPr>
+          <p:style>
+            <a:lnRef idx="1">
+              <a:schemeClr val="accent2"/>
+            </a:lnRef>
+            <a:fillRef idx="0">
+              <a:schemeClr val="accent2"/>
+            </a:fillRef>
+            <a:effectRef idx="0">
+              <a:schemeClr val="accent2"/>
+            </a:effectRef>
+            <a:fontRef idx="minor">
+              <a:schemeClr val="tx1"/>
+            </a:fontRef>
+          </p:style>
+        </p:cxnSp>
+        <p:cxnSp>
+          <p:nvCxnSpPr>
+            <p:cNvPr id="51" name="Connettore diritto 50">
+              <a:extLst>
+                <a:ext uri="{FF2B5EF4-FFF2-40B4-BE49-F238E27FC236}">
+                  <a16:creationId xmlns:a16="http://schemas.microsoft.com/office/drawing/2014/main" id="{D005B352-E517-B793-3AA2-3A19579A6C5D}"/>
+                </a:ext>
+              </a:extLst>
+            </p:cNvPr>
+            <p:cNvCxnSpPr>
+              <a:cxnSpLocks/>
+              <a:endCxn id="29" idx="2"/>
+            </p:cNvCxnSpPr>
+            <p:nvPr/>
+          </p:nvCxnSpPr>
+          <p:spPr>
+            <a:xfrm flipV="1">
+              <a:off x="5635852" y="2851211"/>
+              <a:ext cx="1314462" cy="934311"/>
+            </a:xfrm>
+            <a:prstGeom prst="line">
+              <a:avLst/>
+            </a:prstGeom>
+          </p:spPr>
+          <p:style>
+            <a:lnRef idx="1">
+              <a:schemeClr val="accent2"/>
+            </a:lnRef>
+            <a:fillRef idx="0">
+              <a:schemeClr val="accent2"/>
+            </a:fillRef>
+            <a:effectRef idx="0">
+              <a:schemeClr val="accent2"/>
+            </a:effectRef>
+            <a:fontRef idx="minor">
+              <a:schemeClr val="tx1"/>
+            </a:fontRef>
+          </p:style>
+        </p:cxnSp>
+        <p:sp>
+          <p:nvSpPr>
+            <p:cNvPr id="53" name="CasellaDiTesto 52">
+              <a:extLst>
+                <a:ext uri="{FF2B5EF4-FFF2-40B4-BE49-F238E27FC236}">
+                  <a16:creationId xmlns:a16="http://schemas.microsoft.com/office/drawing/2014/main" id="{A1EF24E6-F95B-EE97-8AE9-F89A9F6069C7}"/>
+                </a:ext>
+              </a:extLst>
+            </p:cNvPr>
+            <p:cNvSpPr txBox="1"/>
+            <p:nvPr/>
+          </p:nvSpPr>
+          <p:spPr>
+            <a:xfrm>
+              <a:off x="6365289" y="2242209"/>
+              <a:ext cx="184731" cy="369332"/>
+            </a:xfrm>
+            <a:prstGeom prst="rect">
+              <a:avLst/>
+            </a:prstGeom>
+            <a:noFill/>
+          </p:spPr>
+          <p:txBody>
+            <a:bodyPr wrap="none" rtlCol="0">
+              <a:spAutoFit/>
+            </a:bodyPr>
+            <a:lstStyle/>
+            <a:p>
+              <a:endParaRPr lang="it-IT" dirty="0"/>
+            </a:p>
+          </p:txBody>
+        </p:sp>
+        <p:sp>
+          <p:nvSpPr>
+            <p:cNvPr id="57" name="Ovale 56">
+              <a:extLst>
+                <a:ext uri="{FF2B5EF4-FFF2-40B4-BE49-F238E27FC236}">
+                  <a16:creationId xmlns:a16="http://schemas.microsoft.com/office/drawing/2014/main" id="{A074FDA0-BC23-10A7-5F05-54DC6057A39E}"/>
+                </a:ext>
+              </a:extLst>
+            </p:cNvPr>
+            <p:cNvSpPr/>
+            <p:nvPr/>
+          </p:nvSpPr>
+          <p:spPr>
+            <a:xfrm>
+              <a:off x="4101924" y="3053877"/>
+              <a:ext cx="1533928" cy="1402671"/>
+            </a:xfrm>
+            <a:prstGeom prst="ellipse">
+              <a:avLst/>
+            </a:prstGeom>
+            <a:noFill/>
+          </p:spPr>
+          <p:style>
+            <a:lnRef idx="2">
+              <a:schemeClr val="accent1">
+                <a:shade val="15000"/>
+              </a:schemeClr>
+            </a:lnRef>
+            <a:fillRef idx="1">
+              <a:schemeClr val="accent1"/>
+            </a:fillRef>
+            <a:effectRef idx="0">
+              <a:schemeClr val="accent1"/>
+            </a:effectRef>
+            <a:fontRef idx="minor">
+              <a:schemeClr val="lt1"/>
+            </a:fontRef>
+          </p:style>
+          <p:txBody>
+            <a:bodyPr rtlCol="0" anchor="ctr"/>
+            <a:lstStyle/>
+            <a:p>
+              <a:pPr algn="ctr"/>
+              <a:endParaRPr lang="it-IT"/>
+            </a:p>
+          </p:txBody>
+        </p:sp>
+        <p:cxnSp>
+          <p:nvCxnSpPr>
+            <p:cNvPr id="60" name="Connettore diritto 59">
+              <a:extLst>
+                <a:ext uri="{FF2B5EF4-FFF2-40B4-BE49-F238E27FC236}">
+                  <a16:creationId xmlns:a16="http://schemas.microsoft.com/office/drawing/2014/main" id="{C0BA5BAA-D3CD-A17A-93A5-E8A07AEA5F23}"/>
+                </a:ext>
+              </a:extLst>
+            </p:cNvPr>
+            <p:cNvCxnSpPr>
+              <a:cxnSpLocks/>
+            </p:cNvCxnSpPr>
+            <p:nvPr/>
+          </p:nvCxnSpPr>
+          <p:spPr>
+            <a:xfrm>
+              <a:off x="8551267" y="2835656"/>
+              <a:ext cx="1009983" cy="0"/>
+            </a:xfrm>
+            <a:prstGeom prst="line">
+              <a:avLst/>
+            </a:prstGeom>
+          </p:spPr>
+          <p:style>
+            <a:lnRef idx="1">
+              <a:schemeClr val="accent1"/>
+            </a:lnRef>
+            <a:fillRef idx="0">
+              <a:schemeClr val="accent1"/>
+            </a:fillRef>
+            <a:effectRef idx="0">
+              <a:schemeClr val="accent1"/>
+            </a:effectRef>
+            <a:fontRef idx="minor">
+              <a:schemeClr val="tx1"/>
+            </a:fontRef>
+          </p:style>
+        </p:cxnSp>
+      </p:grpSp>
+      <p:pic>
+        <p:nvPicPr>
+          <p:cNvPr id="62" name="Immagine 61">
+            <a:extLst>
+              <a:ext uri="{FF2B5EF4-FFF2-40B4-BE49-F238E27FC236}">
+                <a16:creationId xmlns:a16="http://schemas.microsoft.com/office/drawing/2014/main" id="{3B2C1CC6-136F-B0A7-4CA2-5785F1DE1561}"/>
+              </a:ext>
+            </a:extLst>
+          </p:cNvPr>
+          <p:cNvPicPr>
+            <a:picLocks noChangeAspect="1"/>
+          </p:cNvPicPr>
+          <p:nvPr/>
+        </p:nvPicPr>
+        <p:blipFill>
+          <a:blip r:embed="rId2">
+            <a:extLst>
+              <a:ext uri="{28A0092B-C50C-407E-A947-70E740481C1C}">
+                <a14:useLocalDpi xmlns:a14="http://schemas.microsoft.com/office/drawing/2010/main" val="0"/>
+              </a:ext>
+            </a:extLst>
+          </a:blip>
+          <a:stretch>
+            <a:fillRect/>
+          </a:stretch>
+        </p:blipFill>
+        <p:spPr>
+          <a:xfrm>
+            <a:off x="1270159" y="4829504"/>
+            <a:ext cx="3402749" cy="1283672"/>
+          </a:xfrm>
+          <a:prstGeom prst="rect">
+            <a:avLst/>
+          </a:prstGeom>
+        </p:spPr>
+      </p:pic>
+      <p:sp>
+        <p:nvSpPr>
+          <p:cNvPr id="63" name="CasellaDiTesto 62">
+            <a:extLst>
+              <a:ext uri="{FF2B5EF4-FFF2-40B4-BE49-F238E27FC236}">
+                <a16:creationId xmlns:a16="http://schemas.microsoft.com/office/drawing/2014/main" id="{0CC390FC-AC2A-50E6-AFFE-7165DC3D8E43}"/>
+              </a:ext>
+            </a:extLst>
+          </p:cNvPr>
+          <p:cNvSpPr txBox="1"/>
+          <p:nvPr/>
+        </p:nvSpPr>
+        <p:spPr>
+          <a:xfrm>
+            <a:off x="5268286" y="212492"/>
+            <a:ext cx="6853807" cy="1792798"/>
+          </a:xfrm>
+          <a:prstGeom prst="rect">
+            <a:avLst/>
+          </a:prstGeom>
+          <a:noFill/>
+        </p:spPr>
+        <p:txBody>
+          <a:bodyPr wrap="square" rtlCol="0">
+            <a:spAutoFit/>
+          </a:bodyPr>
+          <a:lstStyle/>
+          <a:p>
+            <a:pPr algn="ctr"/>
+            <a:r>
+              <a:rPr lang="en-IN" sz="3200" b="1" noProof="0" dirty="0">
+                <a:latin typeface="Book Antiqua" panose="02040602050305030304" pitchFamily="18" charset="0"/>
+              </a:rPr>
+              <a:t>We will</a:t>
+            </a:r>
+          </a:p>
+          <a:p>
+            <a:pPr algn="ctr"/>
+            <a:endParaRPr lang="it-IT" sz="1050" b="1" dirty="0">
+              <a:latin typeface="Book Antiqua" panose="02040602050305030304" pitchFamily="18" charset="0"/>
+            </a:endParaRPr>
+          </a:p>
+          <a:p>
+            <a:pPr marL="285750" indent="-285750">
+              <a:buFont typeface="Arial" panose="020B0604020202020204" pitchFamily="34" charset="0"/>
+              <a:buChar char="•"/>
+            </a:pPr>
+            <a:r>
+              <a:rPr lang="en-US" sz="1700" dirty="0">
+                <a:latin typeface="Book Antiqua" panose="02040602050305030304" pitchFamily="18" charset="0"/>
+              </a:rPr>
+              <a:t>Build the three models we discussed (using </a:t>
+            </a:r>
+            <a:r>
+              <a:rPr lang="en-US" sz="1700" dirty="0" err="1">
+                <a:latin typeface="Book Antiqua" panose="02040602050305030304" pitchFamily="18" charset="0"/>
+                <a:hlinkClick r:id="rId3"/>
+              </a:rPr>
+              <a:t>Keras</a:t>
+            </a:r>
+            <a:r>
+              <a:rPr lang="en-US" sz="1700" dirty="0">
+                <a:latin typeface="Book Antiqua" panose="02040602050305030304" pitchFamily="18" charset="0"/>
+              </a:rPr>
+              <a:t>)</a:t>
+            </a:r>
+          </a:p>
+          <a:p>
+            <a:pPr marL="285750" indent="-285750">
+              <a:buFont typeface="Arial" panose="020B0604020202020204" pitchFamily="34" charset="0"/>
+              <a:buChar char="•"/>
+            </a:pPr>
+            <a:r>
+              <a:rPr lang="en-US" sz="1700" dirty="0">
+                <a:latin typeface="Book Antiqua" panose="02040602050305030304" pitchFamily="18" charset="0"/>
+              </a:rPr>
+              <a:t>Take our first look at </a:t>
+            </a:r>
+            <a:r>
+              <a:rPr lang="en-US" sz="1700" dirty="0">
+                <a:latin typeface="Book Antiqua" panose="02040602050305030304" pitchFamily="18" charset="0"/>
+                <a:hlinkClick r:id="rId4"/>
+              </a:rPr>
+              <a:t>Google </a:t>
+            </a:r>
+            <a:r>
+              <a:rPr lang="en-US" sz="1700" dirty="0" err="1">
+                <a:latin typeface="Book Antiqua" panose="02040602050305030304" pitchFamily="18" charset="0"/>
+                <a:hlinkClick r:id="rId4"/>
+              </a:rPr>
+              <a:t>Colab</a:t>
+            </a:r>
+            <a:r>
+              <a:rPr lang="en-US" sz="1700" dirty="0">
+                <a:latin typeface="Book Antiqua" panose="02040602050305030304" pitchFamily="18" charset="0"/>
+              </a:rPr>
+              <a:t> (</a:t>
+            </a:r>
+            <a:r>
+              <a:rPr lang="en-US" sz="1700" dirty="0">
+                <a:latin typeface="Book Antiqua" panose="02040602050305030304" pitchFamily="18" charset="0"/>
+                <a:hlinkClick r:id="rId5"/>
+              </a:rPr>
+              <a:t>Getting started with </a:t>
+            </a:r>
+            <a:r>
+              <a:rPr lang="en-US" sz="1700" dirty="0" err="1">
+                <a:latin typeface="Book Antiqua" panose="02040602050305030304" pitchFamily="18" charset="0"/>
+                <a:hlinkClick r:id="rId5"/>
+              </a:rPr>
+              <a:t>Colab</a:t>
+            </a:r>
+            <a:r>
+              <a:rPr lang="en-US" sz="1700" dirty="0">
+                <a:latin typeface="Book Antiqua" panose="02040602050305030304" pitchFamily="18" charset="0"/>
+              </a:rPr>
+              <a:t>)</a:t>
+            </a:r>
+          </a:p>
+          <a:p>
+            <a:pPr marL="285750" indent="-285750">
+              <a:buFont typeface="Arial" panose="020B0604020202020204" pitchFamily="34" charset="0"/>
+              <a:buChar char="•"/>
+            </a:pPr>
+            <a:r>
+              <a:rPr lang="en-US" sz="1700" dirty="0">
+                <a:latin typeface="Book Antiqua" panose="02040602050305030304" pitchFamily="18" charset="0"/>
+              </a:rPr>
+              <a:t>Run Python in </a:t>
+            </a:r>
+            <a:r>
+              <a:rPr lang="en-US" sz="1700" dirty="0">
+                <a:latin typeface="Book Antiqua" panose="02040602050305030304" pitchFamily="18" charset="0"/>
+                <a:hlinkClick r:id="rId6"/>
+              </a:rPr>
+              <a:t>notebooks</a:t>
+            </a:r>
+            <a:endParaRPr lang="en-US" sz="1700" dirty="0">
+              <a:latin typeface="Book Antiqua" panose="02040602050305030304" pitchFamily="18" charset="0"/>
+            </a:endParaRPr>
+          </a:p>
+          <a:p>
+            <a:pPr marL="285750" indent="-285750">
+              <a:buFont typeface="Arial" panose="020B0604020202020204" pitchFamily="34" charset="0"/>
+              <a:buChar char="•"/>
+            </a:pPr>
+            <a:r>
+              <a:rPr lang="en-US" sz="1700" dirty="0">
+                <a:latin typeface="Book Antiqua" panose="02040602050305030304" pitchFamily="18" charset="0"/>
+              </a:rPr>
+              <a:t>Have our first interaction with </a:t>
+            </a:r>
+            <a:r>
+              <a:rPr lang="en-US" sz="1700" dirty="0">
+                <a:latin typeface="Book Antiqua" panose="02040602050305030304" pitchFamily="18" charset="0"/>
+                <a:hlinkClick r:id="rId7"/>
+              </a:rPr>
+              <a:t>GitHub</a:t>
+            </a:r>
+            <a:endParaRPr lang="it-IT" sz="1700" dirty="0">
+              <a:latin typeface="Book Antiqua" panose="02040602050305030304" pitchFamily="18" charset="0"/>
+            </a:endParaRPr>
+          </a:p>
+        </p:txBody>
+      </p:sp>
+    </p:spTree>
+    <p:extLst>
+      <p:ext uri="{BB962C8B-B14F-4D97-AF65-F5344CB8AC3E}">
+        <p14:creationId xmlns:p14="http://schemas.microsoft.com/office/powerpoint/2010/main" val="3235996029"/>
+      </p:ext>
+    </p:extLst>
+  </p:cSld>
+  <p:clrMapOvr>
+    <a:masterClrMapping/>
+  </p:clrMapOvr>
+</p:sld>
+</file>
+
+<file path=ppt/slides/slide8.xml><?xml version="1.0" encoding="utf-8"?>
 <p:sld xmlns:a="http://schemas.openxmlformats.org/drawingml/2006/main" xmlns:r="http://schemas.openxmlformats.org/officeDocument/2006/relationships" xmlns:p="http://schemas.openxmlformats.org/presentationml/2006/main">
   <p:cSld>
     <p:spTree>

</xml_diff>